<commit_message>
Re-update: Games (Zixel Technologies)
Date: 2025-08-21
Time: 14:00
</commit_message>
<xml_diff>
--- a/document.pptx
+++ b/document.pptx
@@ -104,6 +104,11 @@
       </a:defRPr>
     </a:lvl9pPr>
   </p:defaultTextStyle>
+  <p:extLst>
+    <p:ext uri="{EFAFB233-063F-42B5-8137-9DF3F51BA10A}">
+      <p15:sldGuideLst xmlns:p15="http://schemas.microsoft.com/office/powerpoint/2012/main"/>
+    </p:ext>
+  </p:extLst>
 </p:presentation>
 </file>
 
@@ -3357,7 +3362,7 @@
         <p:spPr>
           <a:xfrm>
             <a:off x="996696" y="731520"/>
-            <a:ext cx="2079415" cy="584775"/>
+            <a:ext cx="2710999" cy="584775"/>
           </a:xfrm>
           <a:prstGeom prst="rect">
             <a:avLst/>
@@ -3374,7 +3379,7 @@
               <a:rPr lang="en-US" sz="3200" dirty="0">
                 <a:latin typeface="DIN Black" panose="02020500000000000000" pitchFamily="18" charset="0"/>
               </a:rPr>
-              <a:t>…/palette</a:t>
+              <a:t>…/tic-tac-toe</a:t>
             </a:r>
             <a:endParaRPr lang="en-GB" sz="3200" dirty="0">
               <a:latin typeface="DIN Black" panose="02020500000000000000" pitchFamily="18" charset="0"/>
@@ -3397,7 +3402,7 @@
         <p:spPr>
           <a:xfrm>
             <a:off x="996695" y="1316295"/>
-            <a:ext cx="3692036" cy="584775"/>
+            <a:ext cx="729687" cy="584775"/>
           </a:xfrm>
           <a:prstGeom prst="rect">
             <a:avLst/>
@@ -3414,7 +3419,7 @@
               <a:rPr lang="en-US" sz="3200" dirty="0">
                 <a:latin typeface="DIN Black" panose="02020500000000000000" pitchFamily="18" charset="0"/>
               </a:rPr>
-              <a:t>…/play/tic-tac-toe</a:t>
+              <a:t>…/</a:t>
             </a:r>
             <a:endParaRPr lang="en-GB" sz="3200" dirty="0">
               <a:latin typeface="DIN Black" panose="02020500000000000000" pitchFamily="18" charset="0"/>

</xml_diff>